<commit_message>
remove RG to user and models certificate
</commit_message>
<xml_diff>
--- a/src/main/resources/models/CertificateNR10.pptx
+++ b/src/main/resources/models/CertificateNR10.pptx
@@ -12448,7 +12448,7 @@
         <p:spPr bwMode="auto">
           <a:xfrm>
             <a:off x="791915" y="2157832"/>
-            <a:ext cx="7056784" cy="2739211"/>
+            <a:ext cx="7056784" cy="2462213"/>
           </a:xfrm>
           <a:prstGeom prst="rect">
             <a:avLst/>
@@ -12625,25 +12625,34 @@
                 </a:solidFill>
                 <a:latin typeface="Arial" panose="020B0604020202020204" pitchFamily="34" charset="0"/>
               </a:rPr>
-              <a:t>portador do RG nº </a:t>
-            </a:r>
-            <a:r>
-              <a:rPr lang="pt-BR" altLang="pt-BR" dirty="0" smtClean="0">
+              <a:t>portador </a:t>
+            </a:r>
+            <a:r>
+              <a:rPr lang="pt-BR" altLang="pt-BR">
                 <a:solidFill>
                   <a:schemeClr val="bg1"/>
                 </a:solidFill>
                 <a:latin typeface="Arial" panose="020B0604020202020204" pitchFamily="34" charset="0"/>
               </a:rPr>
-              <a:t>{{RG}} </a:t>
-            </a:r>
-            <a:r>
-              <a:rPr lang="pt-BR" altLang="pt-BR" dirty="0">
+              <a:t>do </a:t>
+            </a:r>
+            <a:r>
+              <a:rPr lang="pt-BR" altLang="pt-BR" smtClean="0">
                 <a:solidFill>
                   <a:schemeClr val="bg1"/>
                 </a:solidFill>
                 <a:latin typeface="Arial" panose="020B0604020202020204" pitchFamily="34" charset="0"/>
               </a:rPr>
-              <a:t>e CPF nº </a:t>
+              <a:t>CPF </a:t>
+            </a:r>
+            <a:r>
+              <a:rPr lang="pt-BR" altLang="pt-BR" dirty="0">
+                <a:solidFill>
+                  <a:schemeClr val="bg1"/>
+                </a:solidFill>
+                <a:latin typeface="Arial" panose="020B0604020202020204" pitchFamily="34" charset="0"/>
+              </a:rPr>
+              <a:t>nº </a:t>
             </a:r>
             <a:r>
               <a:rPr lang="pt-BR" altLang="pt-BR" dirty="0" smtClean="0">
@@ -12745,19 +12754,10 @@
                 </a:solidFill>
                 <a:latin typeface="Arial" panose="020B0604020202020204" pitchFamily="34" charset="0"/>
               </a:rPr>
-              <a:t>São Carlos</a:t>
-            </a:r>
-            <a:r>
-              <a:rPr lang="pt-BR" altLang="pt-BR" sz="1400">
-                <a:solidFill>
-                  <a:schemeClr val="bg1"/>
-                </a:solidFill>
-                <a:latin typeface="Arial" panose="020B0604020202020204" pitchFamily="34" charset="0"/>
-              </a:rPr>
-              <a:t>, </a:t>
-            </a:r>
-            <a:r>
-              <a:rPr lang="pt-BR" altLang="pt-BR" sz="1400" smtClean="0">
+              <a:t>São Carlos, </a:t>
+            </a:r>
+            <a:r>
+              <a:rPr lang="pt-BR" altLang="pt-BR" sz="1400" dirty="0" smtClean="0">
                 <a:solidFill>
                   <a:schemeClr val="bg1"/>
                 </a:solidFill>

</xml_diff>